<commit_message>
Prepping for semantic info + chart finished
</commit_message>
<xml_diff>
--- a/figs.pptx
+++ b/figs.pptx
@@ -104,6 +104,11 @@
       </a:defRPr>
     </a:lvl9pPr>
   </p:defaultTextStyle>
+  <p:extLst>
+    <p:ext uri="{EFAFB233-063F-42B5-8137-9DF3F51BA10A}">
+      <p15:sldGuideLst xmlns:p15="http://schemas.microsoft.com/office/powerpoint/2012/main"/>
+    </p:ext>
+  </p:extLst>
 </p:presentation>
 </file>
 
@@ -3323,10 +3328,10 @@
       </p:grpSpPr>
       <p:grpSp>
         <p:nvGrpSpPr>
-          <p:cNvPr id="39" name="Group 38">
-            <a:extLst>
-              <a:ext uri="{FF2B5EF4-FFF2-40B4-BE49-F238E27FC236}">
-                <a16:creationId xmlns:a16="http://schemas.microsoft.com/office/drawing/2014/main" id="{7C82F2BD-7ED9-4832-A809-55F6F0BAA19B}"/>
+          <p:cNvPr id="68" name="Group 67">
+            <a:extLst>
+              <a:ext uri="{FF2B5EF4-FFF2-40B4-BE49-F238E27FC236}">
+                <a16:creationId xmlns:a16="http://schemas.microsoft.com/office/drawing/2014/main" id="{A793C0BC-DD7F-4443-AEE5-DB977EBD523F}"/>
               </a:ext>
             </a:extLst>
           </p:cNvPr>
@@ -3335,159 +3340,18 @@
         </p:nvGrpSpPr>
         <p:grpSpPr>
           <a:xfrm>
-            <a:off x="-1422026" y="-2380254"/>
-            <a:ext cx="15887083" cy="10888380"/>
-            <a:chOff x="-4960356" y="-2241106"/>
-            <a:chExt cx="15887083" cy="10888380"/>
+            <a:off x="-9465320" y="-4487580"/>
+            <a:ext cx="21108680" cy="10888380"/>
+            <a:chOff x="-13860181" y="-1581794"/>
+            <a:chExt cx="21108680" cy="10888380"/>
           </a:xfrm>
         </p:grpSpPr>
-        <p:pic>
-          <p:nvPicPr>
-            <p:cNvPr id="1026" name="Picture 2">
+        <p:grpSp>
+          <p:nvGrpSpPr>
+            <p:cNvPr id="55" name="Group 54">
               <a:extLst>
                 <a:ext uri="{FF2B5EF4-FFF2-40B4-BE49-F238E27FC236}">
-                  <a16:creationId xmlns:a16="http://schemas.microsoft.com/office/drawing/2014/main" id="{3D651BA4-51E8-40AD-9904-4B0271D4B1D9}"/>
-                </a:ext>
-              </a:extLst>
-            </p:cNvPr>
-            <p:cNvPicPr>
-              <a:picLocks noChangeAspect="1" noChangeArrowheads="1"/>
-            </p:cNvPicPr>
-            <p:nvPr/>
-          </p:nvPicPr>
-          <p:blipFill>
-            <a:blip r:embed="rId2">
-              <a:extLst>
-                <a:ext uri="{28A0092B-C50C-407E-A947-70E740481C1C}">
-                  <a14:useLocalDpi xmlns:a14="http://schemas.microsoft.com/office/drawing/2010/main" val="0"/>
-                </a:ext>
-              </a:extLst>
-            </a:blip>
-            <a:srcRect/>
-            <a:stretch>
-              <a:fillRect/>
-            </a:stretch>
-          </p:blipFill>
-          <p:spPr bwMode="auto">
-            <a:xfrm>
-              <a:off x="-4960356" y="-895531"/>
-              <a:ext cx="3486150" cy="2400300"/>
-            </a:xfrm>
-            <a:prstGeom prst="rect">
-              <a:avLst/>
-            </a:prstGeom>
-            <a:noFill/>
-            <a:extLst>
-              <a:ext uri="{909E8E84-426E-40DD-AFC4-6F175D3DCCD1}">
-                <a14:hiddenFill xmlns:a14="http://schemas.microsoft.com/office/drawing/2010/main">
-                  <a:solidFill>
-                    <a:srgbClr val="FFFFFF"/>
-                  </a:solidFill>
-                </a14:hiddenFill>
-              </a:ext>
-            </a:extLst>
-          </p:spPr>
-        </p:pic>
-        <p:pic>
-          <p:nvPicPr>
-            <p:cNvPr id="1028" name="Picture 4">
-              <a:extLst>
-                <a:ext uri="{FF2B5EF4-FFF2-40B4-BE49-F238E27FC236}">
-                  <a16:creationId xmlns:a16="http://schemas.microsoft.com/office/drawing/2014/main" id="{58F22E2D-375B-4D7F-8963-7B04424E57F8}"/>
-                </a:ext>
-              </a:extLst>
-            </p:cNvPr>
-            <p:cNvPicPr>
-              <a:picLocks noChangeAspect="1" noChangeArrowheads="1"/>
-            </p:cNvPicPr>
-            <p:nvPr/>
-          </p:nvPicPr>
-          <p:blipFill>
-            <a:blip r:embed="rId3">
-              <a:extLst>
-                <a:ext uri="{28A0092B-C50C-407E-A947-70E740481C1C}">
-                  <a14:useLocalDpi xmlns:a14="http://schemas.microsoft.com/office/drawing/2010/main" val="0"/>
-                </a:ext>
-              </a:extLst>
-            </a:blip>
-            <a:srcRect/>
-            <a:stretch>
-              <a:fillRect/>
-            </a:stretch>
-          </p:blipFill>
-          <p:spPr bwMode="auto">
-            <a:xfrm>
-              <a:off x="-155629" y="-895531"/>
-              <a:ext cx="2447925" cy="2400300"/>
-            </a:xfrm>
-            <a:prstGeom prst="rect">
-              <a:avLst/>
-            </a:prstGeom>
-            <a:noFill/>
-            <a:extLst>
-              <a:ext uri="{909E8E84-426E-40DD-AFC4-6F175D3DCCD1}">
-                <a14:hiddenFill xmlns:a14="http://schemas.microsoft.com/office/drawing/2010/main">
-                  <a:solidFill>
-                    <a:srgbClr val="FFFFFF"/>
-                  </a:solidFill>
-                </a14:hiddenFill>
-              </a:ext>
-            </a:extLst>
-          </p:spPr>
-        </p:pic>
-        <p:pic>
-          <p:nvPicPr>
-            <p:cNvPr id="1030" name="Picture 6">
-              <a:extLst>
-                <a:ext uri="{FF2B5EF4-FFF2-40B4-BE49-F238E27FC236}">
-                  <a16:creationId xmlns:a16="http://schemas.microsoft.com/office/drawing/2014/main" id="{04719E20-F70C-4A3D-8BB9-EC09CAD78743}"/>
-                </a:ext>
-              </a:extLst>
-            </p:cNvPr>
-            <p:cNvPicPr>
-              <a:picLocks noChangeAspect="1" noChangeArrowheads="1"/>
-            </p:cNvPicPr>
-            <p:nvPr/>
-          </p:nvPicPr>
-          <p:blipFill>
-            <a:blip r:embed="rId4">
-              <a:extLst>
-                <a:ext uri="{28A0092B-C50C-407E-A947-70E740481C1C}">
-                  <a14:useLocalDpi xmlns:a14="http://schemas.microsoft.com/office/drawing/2010/main" val="0"/>
-                </a:ext>
-              </a:extLst>
-            </a:blip>
-            <a:srcRect/>
-            <a:stretch>
-              <a:fillRect/>
-            </a:stretch>
-          </p:blipFill>
-          <p:spPr bwMode="auto">
-            <a:xfrm>
-              <a:off x="3635843" y="-1745295"/>
-              <a:ext cx="4209449" cy="4099828"/>
-            </a:xfrm>
-            <a:prstGeom prst="rect">
-              <a:avLst/>
-            </a:prstGeom>
-            <a:noFill/>
-            <a:extLst>
-              <a:ext uri="{909E8E84-426E-40DD-AFC4-6F175D3DCCD1}">
-                <a14:hiddenFill xmlns:a14="http://schemas.microsoft.com/office/drawing/2010/main">
-                  <a:solidFill>
-                    <a:srgbClr val="FFFFFF"/>
-                  </a:solidFill>
-                </a14:hiddenFill>
-              </a:ext>
-            </a:extLst>
-          </p:spPr>
-        </p:pic>
-        <p:grpSp>
-          <p:nvGrpSpPr>
-            <p:cNvPr id="4" name="Group 3">
-              <a:extLst>
-                <a:ext uri="{FF2B5EF4-FFF2-40B4-BE49-F238E27FC236}">
-                  <a16:creationId xmlns:a16="http://schemas.microsoft.com/office/drawing/2014/main" id="{D2BB0B1B-9A4A-4C67-963B-B3AA0890A68A}"/>
+                  <a16:creationId xmlns:a16="http://schemas.microsoft.com/office/drawing/2014/main" id="{C37C824A-D210-4AB2-B39A-15D3200366FD}"/>
                 </a:ext>
               </a:extLst>
             </p:cNvPr>
@@ -3496,420 +3360,1306 @@
           </p:nvGrpSpPr>
           <p:grpSpPr>
             <a:xfrm>
-              <a:off x="-4960356" y="3061071"/>
-              <a:ext cx="7064430" cy="2298826"/>
-              <a:chOff x="40104" y="3679776"/>
-              <a:chExt cx="7376265" cy="2400300"/>
+              <a:off x="-13860181" y="-1581794"/>
+              <a:ext cx="19362098" cy="10888380"/>
+              <a:chOff x="-13674986" y="-1442898"/>
+              <a:chExt cx="19362098" cy="10888380"/>
             </a:xfrm>
           </p:grpSpPr>
-          <p:pic>
-            <p:nvPicPr>
-              <p:cNvPr id="1032" name="Picture 8">
+          <p:grpSp>
+            <p:nvGrpSpPr>
+              <p:cNvPr id="39" name="Group 38">
                 <a:extLst>
                   <a:ext uri="{FF2B5EF4-FFF2-40B4-BE49-F238E27FC236}">
-                    <a16:creationId xmlns:a16="http://schemas.microsoft.com/office/drawing/2014/main" id="{D7D5393D-A10F-47DC-90FC-FC3AC992F7D2}"/>
+                    <a16:creationId xmlns:a16="http://schemas.microsoft.com/office/drawing/2014/main" id="{7C82F2BD-7ED9-4832-A809-55F6F0BAA19B}"/>
                   </a:ext>
                 </a:extLst>
               </p:cNvPr>
-              <p:cNvPicPr>
-                <a:picLocks noChangeAspect="1" noChangeArrowheads="1"/>
-              </p:cNvPicPr>
+              <p:cNvGrpSpPr/>
               <p:nvPr/>
-            </p:nvPicPr>
-            <p:blipFill>
-              <a:blip r:embed="rId5">
+            </p:nvGrpSpPr>
+            <p:grpSpPr>
+              <a:xfrm>
+                <a:off x="-13674986" y="-1442898"/>
+                <a:ext cx="15887083" cy="10888380"/>
+                <a:chOff x="-4960356" y="-2241106"/>
+                <a:chExt cx="15887083" cy="10888380"/>
+              </a:xfrm>
+            </p:grpSpPr>
+            <p:pic>
+              <p:nvPicPr>
+                <p:cNvPr id="1026" name="Picture 2">
+                  <a:extLst>
+                    <a:ext uri="{FF2B5EF4-FFF2-40B4-BE49-F238E27FC236}">
+                      <a16:creationId xmlns:a16="http://schemas.microsoft.com/office/drawing/2014/main" id="{3D651BA4-51E8-40AD-9904-4B0271D4B1D9}"/>
+                    </a:ext>
+                  </a:extLst>
+                </p:cNvPr>
+                <p:cNvPicPr>
+                  <a:picLocks noChangeAspect="1" noChangeArrowheads="1"/>
+                </p:cNvPicPr>
+                <p:nvPr/>
+              </p:nvPicPr>
+              <p:blipFill>
+                <a:blip r:embed="rId2">
+                  <a:extLst>
+                    <a:ext uri="{28A0092B-C50C-407E-A947-70E740481C1C}">
+                      <a14:useLocalDpi xmlns:a14="http://schemas.microsoft.com/office/drawing/2010/main" val="0"/>
+                    </a:ext>
+                  </a:extLst>
+                </a:blip>
+                <a:srcRect/>
+                <a:stretch>
+                  <a:fillRect/>
+                </a:stretch>
+              </p:blipFill>
+              <p:spPr bwMode="auto">
+                <a:xfrm>
+                  <a:off x="-4960356" y="-895531"/>
+                  <a:ext cx="3486150" cy="2400300"/>
+                </a:xfrm>
+                <a:prstGeom prst="rect">
+                  <a:avLst/>
+                </a:prstGeom>
+                <a:noFill/>
                 <a:extLst>
-                  <a:ext uri="{28A0092B-C50C-407E-A947-70E740481C1C}">
-                    <a14:useLocalDpi xmlns:a14="http://schemas.microsoft.com/office/drawing/2010/main" val="0"/>
+                  <a:ext uri="{909E8E84-426E-40DD-AFC4-6F175D3DCCD1}">
+                    <a14:hiddenFill xmlns:a14="http://schemas.microsoft.com/office/drawing/2010/main">
+                      <a:solidFill>
+                        <a:srgbClr val="FFFFFF"/>
+                      </a:solidFill>
+                    </a14:hiddenFill>
                   </a:ext>
                 </a:extLst>
-              </a:blip>
-              <a:srcRect/>
-              <a:stretch>
-                <a:fillRect/>
-              </a:stretch>
-            </p:blipFill>
-            <p:spPr bwMode="auto">
+              </p:spPr>
+            </p:pic>
+            <p:pic>
+              <p:nvPicPr>
+                <p:cNvPr id="1028" name="Picture 4">
+                  <a:extLst>
+                    <a:ext uri="{FF2B5EF4-FFF2-40B4-BE49-F238E27FC236}">
+                      <a16:creationId xmlns:a16="http://schemas.microsoft.com/office/drawing/2014/main" id="{58F22E2D-375B-4D7F-8963-7B04424E57F8}"/>
+                    </a:ext>
+                  </a:extLst>
+                </p:cNvPr>
+                <p:cNvPicPr>
+                  <a:picLocks noChangeAspect="1" noChangeArrowheads="1"/>
+                </p:cNvPicPr>
+                <p:nvPr/>
+              </p:nvPicPr>
+              <p:blipFill>
+                <a:blip r:embed="rId3">
+                  <a:extLst>
+                    <a:ext uri="{28A0092B-C50C-407E-A947-70E740481C1C}">
+                      <a14:useLocalDpi xmlns:a14="http://schemas.microsoft.com/office/drawing/2010/main" val="0"/>
+                    </a:ext>
+                  </a:extLst>
+                </a:blip>
+                <a:srcRect/>
+                <a:stretch>
+                  <a:fillRect/>
+                </a:stretch>
+              </p:blipFill>
+              <p:spPr bwMode="auto">
+                <a:xfrm>
+                  <a:off x="-155629" y="-895531"/>
+                  <a:ext cx="2447925" cy="2400300"/>
+                </a:xfrm>
+                <a:prstGeom prst="rect">
+                  <a:avLst/>
+                </a:prstGeom>
+                <a:noFill/>
+                <a:extLst>
+                  <a:ext uri="{909E8E84-426E-40DD-AFC4-6F175D3DCCD1}">
+                    <a14:hiddenFill xmlns:a14="http://schemas.microsoft.com/office/drawing/2010/main">
+                      <a:solidFill>
+                        <a:srgbClr val="FFFFFF"/>
+                      </a:solidFill>
+                    </a14:hiddenFill>
+                  </a:ext>
+                </a:extLst>
+              </p:spPr>
+            </p:pic>
+            <p:pic>
+              <p:nvPicPr>
+                <p:cNvPr id="1030" name="Picture 6">
+                  <a:extLst>
+                    <a:ext uri="{FF2B5EF4-FFF2-40B4-BE49-F238E27FC236}">
+                      <a16:creationId xmlns:a16="http://schemas.microsoft.com/office/drawing/2014/main" id="{04719E20-F70C-4A3D-8BB9-EC09CAD78743}"/>
+                    </a:ext>
+                  </a:extLst>
+                </p:cNvPr>
+                <p:cNvPicPr>
+                  <a:picLocks noChangeAspect="1" noChangeArrowheads="1"/>
+                </p:cNvPicPr>
+                <p:nvPr/>
+              </p:nvPicPr>
+              <p:blipFill>
+                <a:blip r:embed="rId4">
+                  <a:extLst>
+                    <a:ext uri="{28A0092B-C50C-407E-A947-70E740481C1C}">
+                      <a14:useLocalDpi xmlns:a14="http://schemas.microsoft.com/office/drawing/2010/main" val="0"/>
+                    </a:ext>
+                  </a:extLst>
+                </a:blip>
+                <a:srcRect/>
+                <a:stretch>
+                  <a:fillRect/>
+                </a:stretch>
+              </p:blipFill>
+              <p:spPr bwMode="auto">
+                <a:xfrm>
+                  <a:off x="3635843" y="-1745295"/>
+                  <a:ext cx="4209449" cy="4099828"/>
+                </a:xfrm>
+                <a:prstGeom prst="rect">
+                  <a:avLst/>
+                </a:prstGeom>
+                <a:noFill/>
+                <a:extLst>
+                  <a:ext uri="{909E8E84-426E-40DD-AFC4-6F175D3DCCD1}">
+                    <a14:hiddenFill xmlns:a14="http://schemas.microsoft.com/office/drawing/2010/main">
+                      <a:solidFill>
+                        <a:srgbClr val="FFFFFF"/>
+                      </a:solidFill>
+                    </a14:hiddenFill>
+                  </a:ext>
+                </a:extLst>
+              </p:spPr>
+            </p:pic>
+            <p:grpSp>
+              <p:nvGrpSpPr>
+                <p:cNvPr id="4" name="Group 3">
+                  <a:extLst>
+                    <a:ext uri="{FF2B5EF4-FFF2-40B4-BE49-F238E27FC236}">
+                      <a16:creationId xmlns:a16="http://schemas.microsoft.com/office/drawing/2014/main" id="{D2BB0B1B-9A4A-4C67-963B-B3AA0890A68A}"/>
+                    </a:ext>
+                  </a:extLst>
+                </p:cNvPr>
+                <p:cNvGrpSpPr/>
+                <p:nvPr/>
+              </p:nvGrpSpPr>
+              <p:grpSpPr>
+                <a:xfrm>
+                  <a:off x="-4960356" y="3061071"/>
+                  <a:ext cx="7064430" cy="2298826"/>
+                  <a:chOff x="40104" y="3679776"/>
+                  <a:chExt cx="7376265" cy="2400300"/>
+                </a:xfrm>
+              </p:grpSpPr>
+              <p:pic>
+                <p:nvPicPr>
+                  <p:cNvPr id="1032" name="Picture 8">
+                    <a:extLst>
+                      <a:ext uri="{FF2B5EF4-FFF2-40B4-BE49-F238E27FC236}">
+                        <a16:creationId xmlns:a16="http://schemas.microsoft.com/office/drawing/2014/main" id="{D7D5393D-A10F-47DC-90FC-FC3AC992F7D2}"/>
+                      </a:ext>
+                    </a:extLst>
+                  </p:cNvPr>
+                  <p:cNvPicPr>
+                    <a:picLocks noChangeAspect="1" noChangeArrowheads="1"/>
+                  </p:cNvPicPr>
+                  <p:nvPr/>
+                </p:nvPicPr>
+                <p:blipFill>
+                  <a:blip r:embed="rId5">
+                    <a:extLst>
+                      <a:ext uri="{28A0092B-C50C-407E-A947-70E740481C1C}">
+                        <a14:useLocalDpi xmlns:a14="http://schemas.microsoft.com/office/drawing/2010/main" val="0"/>
+                      </a:ext>
+                    </a:extLst>
+                  </a:blip>
+                  <a:srcRect/>
+                  <a:stretch>
+                    <a:fillRect/>
+                  </a:stretch>
+                </p:blipFill>
+                <p:spPr bwMode="auto">
+                  <a:xfrm>
+                    <a:off x="40104" y="3679776"/>
+                    <a:ext cx="2447925" cy="2400300"/>
+                  </a:xfrm>
+                  <a:prstGeom prst="rect">
+                    <a:avLst/>
+                  </a:prstGeom>
+                  <a:noFill/>
+                  <a:extLst>
+                    <a:ext uri="{909E8E84-426E-40DD-AFC4-6F175D3DCCD1}">
+                      <a14:hiddenFill xmlns:a14="http://schemas.microsoft.com/office/drawing/2010/main">
+                        <a:solidFill>
+                          <a:srgbClr val="FFFFFF"/>
+                        </a:solidFill>
+                      </a14:hiddenFill>
+                    </a:ext>
+                  </a:extLst>
+                </p:spPr>
+              </p:pic>
+              <p:pic>
+                <p:nvPicPr>
+                  <p:cNvPr id="1034" name="Picture 10">
+                    <a:extLst>
+                      <a:ext uri="{FF2B5EF4-FFF2-40B4-BE49-F238E27FC236}">
+                        <a16:creationId xmlns:a16="http://schemas.microsoft.com/office/drawing/2014/main" id="{6675C67E-CEDF-4FEA-9A69-03A0AC5593A2}"/>
+                      </a:ext>
+                    </a:extLst>
+                  </p:cNvPr>
+                  <p:cNvPicPr>
+                    <a:picLocks noChangeAspect="1" noChangeArrowheads="1"/>
+                  </p:cNvPicPr>
+                  <p:nvPr/>
+                </p:nvPicPr>
+                <p:blipFill>
+                  <a:blip r:embed="rId6">
+                    <a:extLst>
+                      <a:ext uri="{28A0092B-C50C-407E-A947-70E740481C1C}">
+                        <a14:useLocalDpi xmlns:a14="http://schemas.microsoft.com/office/drawing/2010/main" val="0"/>
+                      </a:ext>
+                    </a:extLst>
+                  </a:blip>
+                  <a:srcRect/>
+                  <a:stretch>
+                    <a:fillRect/>
+                  </a:stretch>
+                </p:blipFill>
+                <p:spPr bwMode="auto">
+                  <a:xfrm>
+                    <a:off x="2504274" y="3679776"/>
+                    <a:ext cx="2447925" cy="2400300"/>
+                  </a:xfrm>
+                  <a:prstGeom prst="rect">
+                    <a:avLst/>
+                  </a:prstGeom>
+                  <a:noFill/>
+                  <a:extLst>
+                    <a:ext uri="{909E8E84-426E-40DD-AFC4-6F175D3DCCD1}">
+                      <a14:hiddenFill xmlns:a14="http://schemas.microsoft.com/office/drawing/2010/main">
+                        <a:solidFill>
+                          <a:srgbClr val="FFFFFF"/>
+                        </a:solidFill>
+                      </a14:hiddenFill>
+                    </a:ext>
+                  </a:extLst>
+                </p:spPr>
+              </p:pic>
+              <p:pic>
+                <p:nvPicPr>
+                  <p:cNvPr id="1036" name="Picture 12">
+                    <a:extLst>
+                      <a:ext uri="{FF2B5EF4-FFF2-40B4-BE49-F238E27FC236}">
+                        <a16:creationId xmlns:a16="http://schemas.microsoft.com/office/drawing/2014/main" id="{B3553DDB-4F7F-4460-B108-4F0869B3EC79}"/>
+                      </a:ext>
+                    </a:extLst>
+                  </p:cNvPr>
+                  <p:cNvPicPr>
+                    <a:picLocks noChangeAspect="1" noChangeArrowheads="1"/>
+                  </p:cNvPicPr>
+                  <p:nvPr/>
+                </p:nvPicPr>
+                <p:blipFill>
+                  <a:blip r:embed="rId7">
+                    <a:extLst>
+                      <a:ext uri="{28A0092B-C50C-407E-A947-70E740481C1C}">
+                        <a14:useLocalDpi xmlns:a14="http://schemas.microsoft.com/office/drawing/2010/main" val="0"/>
+                      </a:ext>
+                    </a:extLst>
+                  </a:blip>
+                  <a:srcRect/>
+                  <a:stretch>
+                    <a:fillRect/>
+                  </a:stretch>
+                </p:blipFill>
+                <p:spPr bwMode="auto">
+                  <a:xfrm>
+                    <a:off x="4968444" y="3679776"/>
+                    <a:ext cx="2447925" cy="2400300"/>
+                  </a:xfrm>
+                  <a:prstGeom prst="rect">
+                    <a:avLst/>
+                  </a:prstGeom>
+                  <a:noFill/>
+                  <a:extLst>
+                    <a:ext uri="{909E8E84-426E-40DD-AFC4-6F175D3DCCD1}">
+                      <a14:hiddenFill xmlns:a14="http://schemas.microsoft.com/office/drawing/2010/main">
+                        <a:solidFill>
+                          <a:srgbClr val="FFFFFF"/>
+                        </a:solidFill>
+                      </a14:hiddenFill>
+                    </a:ext>
+                  </a:extLst>
+                </p:spPr>
+              </p:pic>
+            </p:grpSp>
+            <p:grpSp>
+              <p:nvGrpSpPr>
+                <p:cNvPr id="5" name="Group 4">
+                  <a:extLst>
+                    <a:ext uri="{FF2B5EF4-FFF2-40B4-BE49-F238E27FC236}">
+                      <a16:creationId xmlns:a16="http://schemas.microsoft.com/office/drawing/2014/main" id="{C6749DD4-8B3B-4508-B81A-BDD624A9065D}"/>
+                    </a:ext>
+                  </a:extLst>
+                </p:cNvPr>
+                <p:cNvGrpSpPr/>
+                <p:nvPr/>
+              </p:nvGrpSpPr>
+              <p:grpSpPr>
+                <a:xfrm>
+                  <a:off x="-4960356" y="6254332"/>
+                  <a:ext cx="4880843" cy="2392942"/>
+                  <a:chOff x="-1780432" y="2740578"/>
+                  <a:chExt cx="4895850" cy="2400300"/>
+                </a:xfrm>
+              </p:grpSpPr>
+              <p:pic>
+                <p:nvPicPr>
+                  <p:cNvPr id="1038" name="Picture 14">
+                    <a:extLst>
+                      <a:ext uri="{FF2B5EF4-FFF2-40B4-BE49-F238E27FC236}">
+                        <a16:creationId xmlns:a16="http://schemas.microsoft.com/office/drawing/2014/main" id="{4CD7B1BA-B1A7-4798-B553-1639B1F550E1}"/>
+                      </a:ext>
+                    </a:extLst>
+                  </p:cNvPr>
+                  <p:cNvPicPr>
+                    <a:picLocks noChangeAspect="1" noChangeArrowheads="1"/>
+                  </p:cNvPicPr>
+                  <p:nvPr/>
+                </p:nvPicPr>
+                <p:blipFill>
+                  <a:blip r:embed="rId8">
+                    <a:extLst>
+                      <a:ext uri="{28A0092B-C50C-407E-A947-70E740481C1C}">
+                        <a14:useLocalDpi xmlns:a14="http://schemas.microsoft.com/office/drawing/2010/main" val="0"/>
+                      </a:ext>
+                    </a:extLst>
+                  </a:blip>
+                  <a:srcRect/>
+                  <a:stretch>
+                    <a:fillRect/>
+                  </a:stretch>
+                </p:blipFill>
+                <p:spPr bwMode="auto">
+                  <a:xfrm>
+                    <a:off x="-1780432" y="2740578"/>
+                    <a:ext cx="2447925" cy="2400300"/>
+                  </a:xfrm>
+                  <a:prstGeom prst="rect">
+                    <a:avLst/>
+                  </a:prstGeom>
+                  <a:noFill/>
+                  <a:extLst>
+                    <a:ext uri="{909E8E84-426E-40DD-AFC4-6F175D3DCCD1}">
+                      <a14:hiddenFill xmlns:a14="http://schemas.microsoft.com/office/drawing/2010/main">
+                        <a:solidFill>
+                          <a:srgbClr val="FFFFFF"/>
+                        </a:solidFill>
+                      </a14:hiddenFill>
+                    </a:ext>
+                  </a:extLst>
+                </p:spPr>
+              </p:pic>
+              <p:pic>
+                <p:nvPicPr>
+                  <p:cNvPr id="1040" name="Picture 16">
+                    <a:extLst>
+                      <a:ext uri="{FF2B5EF4-FFF2-40B4-BE49-F238E27FC236}">
+                        <a16:creationId xmlns:a16="http://schemas.microsoft.com/office/drawing/2014/main" id="{8AE200ED-8E40-4272-BF01-4948689D1828}"/>
+                      </a:ext>
+                    </a:extLst>
+                  </p:cNvPr>
+                  <p:cNvPicPr>
+                    <a:picLocks noChangeAspect="1" noChangeArrowheads="1"/>
+                  </p:cNvPicPr>
+                  <p:nvPr/>
+                </p:nvPicPr>
+                <p:blipFill>
+                  <a:blip r:embed="rId9">
+                    <a:extLst>
+                      <a:ext uri="{28A0092B-C50C-407E-A947-70E740481C1C}">
+                        <a14:useLocalDpi xmlns:a14="http://schemas.microsoft.com/office/drawing/2010/main" val="0"/>
+                      </a:ext>
+                    </a:extLst>
+                  </a:blip>
+                  <a:srcRect/>
+                  <a:stretch>
+                    <a:fillRect/>
+                  </a:stretch>
+                </p:blipFill>
+                <p:spPr bwMode="auto">
+                  <a:xfrm>
+                    <a:off x="667493" y="2740578"/>
+                    <a:ext cx="2447925" cy="2400300"/>
+                  </a:xfrm>
+                  <a:prstGeom prst="rect">
+                    <a:avLst/>
+                  </a:prstGeom>
+                  <a:noFill/>
+                  <a:extLst>
+                    <a:ext uri="{909E8E84-426E-40DD-AFC4-6F175D3DCCD1}">
+                      <a14:hiddenFill xmlns:a14="http://schemas.microsoft.com/office/drawing/2010/main">
+                        <a:solidFill>
+                          <a:srgbClr val="FFFFFF"/>
+                        </a:solidFill>
+                      </a14:hiddenFill>
+                    </a:ext>
+                  </a:extLst>
+                </p:spPr>
+              </p:pic>
+            </p:grpSp>
+            <p:pic>
+              <p:nvPicPr>
+                <p:cNvPr id="7" name="Picture 6">
+                  <a:extLst>
+                    <a:ext uri="{FF2B5EF4-FFF2-40B4-BE49-F238E27FC236}">
+                      <a16:creationId xmlns:a16="http://schemas.microsoft.com/office/drawing/2014/main" id="{54089F8D-E26D-4C67-86A3-4B846E2F3E62}"/>
+                    </a:ext>
+                  </a:extLst>
+                </p:cNvPr>
+                <p:cNvPicPr>
+                  <a:picLocks noChangeAspect="1"/>
+                </p:cNvPicPr>
+                <p:nvPr/>
+              </p:nvPicPr>
+              <p:blipFill>
+                <a:blip r:embed="rId10"/>
+                <a:stretch>
+                  <a:fillRect/>
+                </a:stretch>
+              </p:blipFill>
+              <p:spPr>
+                <a:xfrm>
+                  <a:off x="5487672" y="4606134"/>
+                  <a:ext cx="5439055" cy="1009702"/>
+                </a:xfrm>
+                <a:prstGeom prst="rect">
+                  <a:avLst/>
+                </a:prstGeom>
+              </p:spPr>
+            </p:pic>
+            <p:pic>
+              <p:nvPicPr>
+                <p:cNvPr id="9" name="Picture 8">
+                  <a:extLst>
+                    <a:ext uri="{FF2B5EF4-FFF2-40B4-BE49-F238E27FC236}">
+                      <a16:creationId xmlns:a16="http://schemas.microsoft.com/office/drawing/2014/main" id="{50E19DFA-507C-4A24-B6BE-C4F8694AB904}"/>
+                    </a:ext>
+                  </a:extLst>
+                </p:cNvPr>
+                <p:cNvPicPr>
+                  <a:picLocks noChangeAspect="1"/>
+                </p:cNvPicPr>
+                <p:nvPr/>
+              </p:nvPicPr>
+              <p:blipFill>
+                <a:blip r:embed="rId11"/>
+                <a:stretch>
+                  <a:fillRect/>
+                </a:stretch>
+              </p:blipFill>
+              <p:spPr>
+                <a:xfrm>
+                  <a:off x="9208888" y="33142"/>
+                  <a:ext cx="1457400" cy="542953"/>
+                </a:xfrm>
+                <a:prstGeom prst="rect">
+                  <a:avLst/>
+                </a:prstGeom>
+              </p:spPr>
+            </p:pic>
+            <p:sp>
+              <p:nvSpPr>
+                <p:cNvPr id="10" name="TextBox 9">
+                  <a:extLst>
+                    <a:ext uri="{FF2B5EF4-FFF2-40B4-BE49-F238E27FC236}">
+                      <a16:creationId xmlns:a16="http://schemas.microsoft.com/office/drawing/2014/main" id="{9F0DE0FF-88CD-4F6C-AEA9-7ECC8C114684}"/>
+                    </a:ext>
+                  </a:extLst>
+                </p:cNvPr>
+                <p:cNvSpPr txBox="1"/>
+                <p:nvPr/>
+              </p:nvSpPr>
+              <p:spPr>
+                <a:xfrm>
+                  <a:off x="-4126712" y="-1324640"/>
+                  <a:ext cx="1818861" cy="369332"/>
+                </a:xfrm>
+                <a:prstGeom prst="rect">
+                  <a:avLst/>
+                </a:prstGeom>
+                <a:noFill/>
+              </p:spPr>
+              <p:txBody>
+                <a:bodyPr wrap="square" rtlCol="0">
+                  <a:spAutoFit/>
+                </a:bodyPr>
+                <a:lstStyle/>
+                <a:p>
+                  <a:pPr algn="ctr"/>
+                  <a:r>
+                    <a:rPr lang="en-US" dirty="0"/>
+                    <a:t>Input Image</a:t>
+                  </a:r>
+                </a:p>
+              </p:txBody>
+            </p:sp>
+            <p:sp>
+              <p:nvSpPr>
+                <p:cNvPr id="19" name="TextBox 18">
+                  <a:extLst>
+                    <a:ext uri="{FF2B5EF4-FFF2-40B4-BE49-F238E27FC236}">
+                      <a16:creationId xmlns:a16="http://schemas.microsoft.com/office/drawing/2014/main" id="{9AFFE3C4-5708-4ED7-A53B-F05C68B79BE2}"/>
+                    </a:ext>
+                  </a:extLst>
+                </p:cNvPr>
+                <p:cNvSpPr txBox="1"/>
+                <p:nvPr/>
+              </p:nvSpPr>
+              <p:spPr>
+                <a:xfrm>
+                  <a:off x="158902" y="-1324640"/>
+                  <a:ext cx="1818861" cy="369332"/>
+                </a:xfrm>
+                <a:prstGeom prst="rect">
+                  <a:avLst/>
+                </a:prstGeom>
+                <a:noFill/>
+              </p:spPr>
+              <p:txBody>
+                <a:bodyPr wrap="square" rtlCol="0">
+                  <a:spAutoFit/>
+                </a:bodyPr>
+                <a:lstStyle/>
+                <a:p>
+                  <a:pPr algn="ctr"/>
+                  <a:r>
+                    <a:rPr lang="en-US" dirty="0"/>
+                    <a:t>Cropped Image</a:t>
+                  </a:r>
+                </a:p>
+              </p:txBody>
+            </p:sp>
+            <p:cxnSp>
+              <p:nvCxnSpPr>
+                <p:cNvPr id="12" name="Straight Arrow Connector 11">
+                  <a:extLst>
+                    <a:ext uri="{FF2B5EF4-FFF2-40B4-BE49-F238E27FC236}">
+                      <a16:creationId xmlns:a16="http://schemas.microsoft.com/office/drawing/2014/main" id="{54890B26-7307-4315-A041-A7918FE7A570}"/>
+                    </a:ext>
+                  </a:extLst>
+                </p:cNvPr>
+                <p:cNvCxnSpPr>
+                  <a:stCxn id="1026" idx="3"/>
+                  <a:endCxn id="1028" idx="1"/>
+                </p:cNvCxnSpPr>
+                <p:nvPr/>
+              </p:nvCxnSpPr>
+              <p:spPr>
+                <a:xfrm>
+                  <a:off x="-1474206" y="304619"/>
+                  <a:ext cx="1318577" cy="0"/>
+                </a:xfrm>
+                <a:prstGeom prst="straightConnector1">
+                  <a:avLst/>
+                </a:prstGeom>
+                <a:ln w="28575">
+                  <a:solidFill>
+                    <a:schemeClr val="tx1"/>
+                  </a:solidFill>
+                  <a:tailEnd type="triangle"/>
+                </a:ln>
+              </p:spPr>
+              <p:style>
+                <a:lnRef idx="1">
+                  <a:schemeClr val="dk1"/>
+                </a:lnRef>
+                <a:fillRef idx="0">
+                  <a:schemeClr val="dk1"/>
+                </a:fillRef>
+                <a:effectRef idx="0">
+                  <a:schemeClr val="dk1"/>
+                </a:effectRef>
+                <a:fontRef idx="minor">
+                  <a:schemeClr val="tx1"/>
+                </a:fontRef>
+              </p:style>
+            </p:cxnSp>
+            <p:sp>
+              <p:nvSpPr>
+                <p:cNvPr id="22" name="TextBox 21">
+                  <a:extLst>
+                    <a:ext uri="{FF2B5EF4-FFF2-40B4-BE49-F238E27FC236}">
+                      <a16:creationId xmlns:a16="http://schemas.microsoft.com/office/drawing/2014/main" id="{183F2C68-7261-4DAD-8056-DBF36C479C14}"/>
+                    </a:ext>
+                  </a:extLst>
+                </p:cNvPr>
+                <p:cNvSpPr txBox="1"/>
+                <p:nvPr/>
+              </p:nvSpPr>
+              <p:spPr>
+                <a:xfrm>
+                  <a:off x="4831136" y="-2241106"/>
+                  <a:ext cx="1818861" cy="369332"/>
+                </a:xfrm>
+                <a:prstGeom prst="rect">
+                  <a:avLst/>
+                </a:prstGeom>
+                <a:noFill/>
+              </p:spPr>
+              <p:txBody>
+                <a:bodyPr wrap="square" rtlCol="0">
+                  <a:spAutoFit/>
+                </a:bodyPr>
+                <a:lstStyle/>
+                <a:p>
+                  <a:pPr algn="ctr"/>
+                  <a:r>
+                    <a:rPr lang="en-US" dirty="0"/>
+                    <a:t>RGB Channels</a:t>
+                  </a:r>
+                </a:p>
+              </p:txBody>
+            </p:sp>
+            <p:cxnSp>
+              <p:nvCxnSpPr>
+                <p:cNvPr id="23" name="Straight Arrow Connector 22">
+                  <a:extLst>
+                    <a:ext uri="{FF2B5EF4-FFF2-40B4-BE49-F238E27FC236}">
+                      <a16:creationId xmlns:a16="http://schemas.microsoft.com/office/drawing/2014/main" id="{B3BB30B9-DAB7-4B6D-A0B5-A2D8C71E3DCF}"/>
+                    </a:ext>
+                  </a:extLst>
+                </p:cNvPr>
+                <p:cNvCxnSpPr>
+                  <a:cxnSpLocks/>
+                  <a:stCxn id="1028" idx="3"/>
+                  <a:endCxn id="1030" idx="1"/>
+                </p:cNvCxnSpPr>
+                <p:nvPr/>
+              </p:nvCxnSpPr>
+              <p:spPr>
+                <a:xfrm>
+                  <a:off x="2292296" y="304619"/>
+                  <a:ext cx="1343547" cy="0"/>
+                </a:xfrm>
+                <a:prstGeom prst="straightConnector1">
+                  <a:avLst/>
+                </a:prstGeom>
+                <a:ln w="28575">
+                  <a:solidFill>
+                    <a:schemeClr val="tx1"/>
+                  </a:solidFill>
+                  <a:tailEnd type="triangle"/>
+                </a:ln>
+              </p:spPr>
+              <p:style>
+                <a:lnRef idx="1">
+                  <a:schemeClr val="dk1"/>
+                </a:lnRef>
+                <a:fillRef idx="0">
+                  <a:schemeClr val="dk1"/>
+                </a:fillRef>
+                <a:effectRef idx="0">
+                  <a:schemeClr val="dk1"/>
+                </a:effectRef>
+                <a:fontRef idx="minor">
+                  <a:schemeClr val="tx1"/>
+                </a:fontRef>
+              </p:style>
+            </p:cxnSp>
+            <p:cxnSp>
+              <p:nvCxnSpPr>
+                <p:cNvPr id="16" name="Connector: Curved 15">
+                  <a:extLst>
+                    <a:ext uri="{FF2B5EF4-FFF2-40B4-BE49-F238E27FC236}">
+                      <a16:creationId xmlns:a16="http://schemas.microsoft.com/office/drawing/2014/main" id="{57DCFE8C-80F0-4C86-81E6-322A8FC5D084}"/>
+                    </a:ext>
+                  </a:extLst>
+                </p:cNvPr>
+                <p:cNvCxnSpPr>
+                  <a:stCxn id="1030" idx="2"/>
+                  <a:endCxn id="1034" idx="0"/>
+                </p:cNvCxnSpPr>
+                <p:nvPr/>
+              </p:nvCxnSpPr>
+              <p:spPr>
+                <a:xfrm rot="5400000">
+                  <a:off x="1802945" y="-876552"/>
+                  <a:ext cx="706538" cy="7168709"/>
+                </a:xfrm>
+                <a:prstGeom prst="curvedConnector3">
+                  <a:avLst>
+                    <a:gd name="adj1" fmla="val 48593"/>
+                  </a:avLst>
+                </a:prstGeom>
+                <a:ln w="28575">
+                  <a:solidFill>
+                    <a:schemeClr val="tx1"/>
+                  </a:solidFill>
+                  <a:tailEnd type="triangle"/>
+                </a:ln>
+              </p:spPr>
+              <p:style>
+                <a:lnRef idx="1">
+                  <a:schemeClr val="accent1"/>
+                </a:lnRef>
+                <a:fillRef idx="0">
+                  <a:schemeClr val="accent1"/>
+                </a:fillRef>
+                <a:effectRef idx="0">
+                  <a:schemeClr val="accent1"/>
+                </a:effectRef>
+                <a:fontRef idx="minor">
+                  <a:schemeClr val="tx1"/>
+                </a:fontRef>
+              </p:style>
+            </p:cxnSp>
+            <p:sp>
+              <p:nvSpPr>
+                <p:cNvPr id="30" name="TextBox 29">
+                  <a:extLst>
+                    <a:ext uri="{FF2B5EF4-FFF2-40B4-BE49-F238E27FC236}">
+                      <a16:creationId xmlns:a16="http://schemas.microsoft.com/office/drawing/2014/main" id="{38944F46-A4EA-49AE-A54A-B9D8503BC95F}"/>
+                    </a:ext>
+                  </a:extLst>
+                </p:cNvPr>
+                <p:cNvSpPr txBox="1"/>
+                <p:nvPr/>
+              </p:nvSpPr>
+              <p:spPr>
+                <a:xfrm>
+                  <a:off x="-4291848" y="2612502"/>
+                  <a:ext cx="1818861" cy="369332"/>
+                </a:xfrm>
+                <a:prstGeom prst="rect">
+                  <a:avLst/>
+                </a:prstGeom>
+                <a:noFill/>
+              </p:spPr>
+              <p:txBody>
+                <a:bodyPr wrap="square" rtlCol="0">
+                  <a:spAutoFit/>
+                </a:bodyPr>
+                <a:lstStyle/>
+                <a:p>
+                  <a:pPr algn="ctr"/>
+                  <a:r>
+                    <a:rPr lang="en-US" dirty="0"/>
+                    <a:t>HSV</a:t>
+                  </a:r>
+                </a:p>
+              </p:txBody>
+            </p:sp>
+            <p:cxnSp>
+              <p:nvCxnSpPr>
+                <p:cNvPr id="31" name="Straight Arrow Connector 30">
+                  <a:extLst>
+                    <a:ext uri="{FF2B5EF4-FFF2-40B4-BE49-F238E27FC236}">
+                      <a16:creationId xmlns:a16="http://schemas.microsoft.com/office/drawing/2014/main" id="{5D354321-A812-4A16-80C0-2C82D2A9D8B7}"/>
+                    </a:ext>
+                  </a:extLst>
+                </p:cNvPr>
+                <p:cNvCxnSpPr>
+                  <a:cxnSpLocks/>
+                  <a:stCxn id="1032" idx="2"/>
+                </p:cNvCxnSpPr>
+                <p:nvPr/>
+              </p:nvCxnSpPr>
+              <p:spPr>
+                <a:xfrm>
+                  <a:off x="-3788137" y="5359897"/>
+                  <a:ext cx="0" cy="800319"/>
+                </a:xfrm>
+                <a:prstGeom prst="straightConnector1">
+                  <a:avLst/>
+                </a:prstGeom>
+                <a:ln w="28575">
+                  <a:solidFill>
+                    <a:schemeClr val="tx1"/>
+                  </a:solidFill>
+                  <a:tailEnd type="triangle"/>
+                </a:ln>
+              </p:spPr>
+              <p:style>
+                <a:lnRef idx="1">
+                  <a:schemeClr val="dk1"/>
+                </a:lnRef>
+                <a:fillRef idx="0">
+                  <a:schemeClr val="dk1"/>
+                </a:fillRef>
+                <a:effectRef idx="0">
+                  <a:schemeClr val="dk1"/>
+                </a:effectRef>
+                <a:fontRef idx="minor">
+                  <a:schemeClr val="tx1"/>
+                </a:fontRef>
+              </p:style>
+            </p:cxnSp>
+            <p:sp>
+              <p:nvSpPr>
+                <p:cNvPr id="36" name="TextBox 35">
+                  <a:extLst>
+                    <a:ext uri="{FF2B5EF4-FFF2-40B4-BE49-F238E27FC236}">
+                      <a16:creationId xmlns:a16="http://schemas.microsoft.com/office/drawing/2014/main" id="{695C3275-7B46-4CB0-93E6-54AF11F2E193}"/>
+                    </a:ext>
+                  </a:extLst>
+                </p:cNvPr>
+                <p:cNvSpPr txBox="1"/>
+                <p:nvPr/>
+              </p:nvSpPr>
+              <p:spPr>
+                <a:xfrm>
+                  <a:off x="-3621058" y="5760056"/>
+                  <a:ext cx="4147832" cy="369332"/>
+                </a:xfrm>
+                <a:prstGeom prst="rect">
+                  <a:avLst/>
+                </a:prstGeom>
+                <a:noFill/>
+              </p:spPr>
+              <p:txBody>
+                <a:bodyPr wrap="square" rtlCol="0">
+                  <a:spAutoFit/>
+                </a:bodyPr>
+                <a:lstStyle/>
+                <a:p>
+                  <a:pPr algn="ctr"/>
+                  <a:r>
+                    <a:rPr lang="en-US" dirty="0"/>
+                    <a:t>K-Means Clustering and Block Reduction</a:t>
+                  </a:r>
+                </a:p>
+              </p:txBody>
+            </p:sp>
+            <p:cxnSp>
+              <p:nvCxnSpPr>
+                <p:cNvPr id="38" name="Connector: Curved 37">
+                  <a:extLst>
+                    <a:ext uri="{FF2B5EF4-FFF2-40B4-BE49-F238E27FC236}">
+                      <a16:creationId xmlns:a16="http://schemas.microsoft.com/office/drawing/2014/main" id="{0E64E53F-892B-4871-B7B8-CF0146757C93}"/>
+                    </a:ext>
+                  </a:extLst>
+                </p:cNvPr>
+                <p:cNvCxnSpPr>
+                  <a:cxnSpLocks/>
+                  <a:stCxn id="1036" idx="3"/>
+                  <a:endCxn id="7" idx="1"/>
+                </p:cNvCxnSpPr>
+                <p:nvPr/>
+              </p:nvCxnSpPr>
+              <p:spPr>
+                <a:xfrm>
+                  <a:off x="2104074" y="4210484"/>
+                  <a:ext cx="3383598" cy="900501"/>
+                </a:xfrm>
+                <a:prstGeom prst="curvedConnector3">
+                  <a:avLst>
+                    <a:gd name="adj1" fmla="val 50000"/>
+                  </a:avLst>
+                </a:prstGeom>
+                <a:ln w="28575">
+                  <a:solidFill>
+                    <a:schemeClr val="tx1"/>
+                  </a:solidFill>
+                  <a:tailEnd type="triangle"/>
+                </a:ln>
+              </p:spPr>
+              <p:style>
+                <a:lnRef idx="1">
+                  <a:schemeClr val="accent1"/>
+                </a:lnRef>
+                <a:fillRef idx="0">
+                  <a:schemeClr val="accent1"/>
+                </a:fillRef>
+                <a:effectRef idx="0">
+                  <a:schemeClr val="accent1"/>
+                </a:effectRef>
+                <a:fontRef idx="minor">
+                  <a:schemeClr val="tx1"/>
+                </a:fontRef>
+              </p:style>
+            </p:cxnSp>
+            <p:cxnSp>
+              <p:nvCxnSpPr>
+                <p:cNvPr id="41" name="Connector: Curved 40">
+                  <a:extLst>
+                    <a:ext uri="{FF2B5EF4-FFF2-40B4-BE49-F238E27FC236}">
+                      <a16:creationId xmlns:a16="http://schemas.microsoft.com/office/drawing/2014/main" id="{139C658E-C68C-427F-81FF-7561A0A7C2F1}"/>
+                    </a:ext>
+                  </a:extLst>
+                </p:cNvPr>
+                <p:cNvCxnSpPr>
+                  <a:cxnSpLocks/>
+                  <a:stCxn id="1040" idx="3"/>
+                  <a:endCxn id="7" idx="1"/>
+                </p:cNvCxnSpPr>
+                <p:nvPr/>
+              </p:nvCxnSpPr>
+              <p:spPr>
+                <a:xfrm flipV="1">
+                  <a:off x="-79513" y="5110985"/>
+                  <a:ext cx="5567185" cy="2339818"/>
+                </a:xfrm>
+                <a:prstGeom prst="curvedConnector3">
+                  <a:avLst>
+                    <a:gd name="adj1" fmla="val 50000"/>
+                  </a:avLst>
+                </a:prstGeom>
+                <a:ln w="28575">
+                  <a:solidFill>
+                    <a:schemeClr val="tx1"/>
+                  </a:solidFill>
+                  <a:tailEnd type="triangle"/>
+                </a:ln>
+              </p:spPr>
+              <p:style>
+                <a:lnRef idx="1">
+                  <a:schemeClr val="accent1"/>
+                </a:lnRef>
+                <a:fillRef idx="0">
+                  <a:schemeClr val="accent1"/>
+                </a:fillRef>
+                <a:effectRef idx="0">
+                  <a:schemeClr val="accent1"/>
+                </a:effectRef>
+                <a:fontRef idx="minor">
+                  <a:schemeClr val="tx1"/>
+                </a:fontRef>
+              </p:style>
+            </p:cxnSp>
+            <p:cxnSp>
+              <p:nvCxnSpPr>
+                <p:cNvPr id="47" name="Straight Arrow Connector 46">
+                  <a:extLst>
+                    <a:ext uri="{FF2B5EF4-FFF2-40B4-BE49-F238E27FC236}">
+                      <a16:creationId xmlns:a16="http://schemas.microsoft.com/office/drawing/2014/main" id="{8E36EDAF-19FE-4862-9020-A85A87C3F7D2}"/>
+                    </a:ext>
+                  </a:extLst>
+                </p:cNvPr>
+                <p:cNvCxnSpPr>
+                  <a:cxnSpLocks/>
+                  <a:stCxn id="1030" idx="3"/>
+                </p:cNvCxnSpPr>
+                <p:nvPr/>
+              </p:nvCxnSpPr>
+              <p:spPr>
+                <a:xfrm>
+                  <a:off x="7845292" y="304619"/>
+                  <a:ext cx="1139682" cy="0"/>
+                </a:xfrm>
+                <a:prstGeom prst="straightConnector1">
+                  <a:avLst/>
+                </a:prstGeom>
+                <a:ln w="28575">
+                  <a:solidFill>
+                    <a:schemeClr val="tx1"/>
+                  </a:solidFill>
+                  <a:tailEnd type="triangle"/>
+                </a:ln>
+              </p:spPr>
+              <p:style>
+                <a:lnRef idx="1">
+                  <a:schemeClr val="dk1"/>
+                </a:lnRef>
+                <a:fillRef idx="0">
+                  <a:schemeClr val="dk1"/>
+                </a:fillRef>
+                <a:effectRef idx="0">
+                  <a:schemeClr val="dk1"/>
+                </a:effectRef>
+                <a:fontRef idx="minor">
+                  <a:schemeClr val="tx1"/>
+                </a:fontRef>
+              </p:style>
+            </p:cxnSp>
+          </p:grpSp>
+          <p:sp>
+            <p:nvSpPr>
+              <p:cNvPr id="29" name="TextBox 28">
+                <a:extLst>
+                  <a:ext uri="{FF2B5EF4-FFF2-40B4-BE49-F238E27FC236}">
+                    <a16:creationId xmlns:a16="http://schemas.microsoft.com/office/drawing/2014/main" id="{05B84C9B-859C-4D9C-8C40-6EA2C1082122}"/>
+                  </a:ext>
+                </a:extLst>
+              </p:cNvPr>
+              <p:cNvSpPr txBox="1"/>
+              <p:nvPr/>
+            </p:nvSpPr>
+            <p:spPr>
               <a:xfrm>
-                <a:off x="40104" y="3679776"/>
-                <a:ext cx="2447925" cy="2400300"/>
+                <a:off x="3058135" y="1570170"/>
+                <a:ext cx="1818861" cy="646331"/>
               </a:xfrm>
               <a:prstGeom prst="rect">
                 <a:avLst/>
               </a:prstGeom>
               <a:noFill/>
-              <a:extLst>
-                <a:ext uri="{909E8E84-426E-40DD-AFC4-6F175D3DCCD1}">
-                  <a14:hiddenFill xmlns:a14="http://schemas.microsoft.com/office/drawing/2010/main">
-                    <a:solidFill>
-                      <a:srgbClr val="FFFFFF"/>
-                    </a:solidFill>
-                  </a14:hiddenFill>
-                </a:ext>
-              </a:extLst>
             </p:spPr>
-          </p:pic>
-          <p:pic>
-            <p:nvPicPr>
-              <p:cNvPr id="1034" name="Picture 10">
+            <p:txBody>
+              <a:bodyPr wrap="square" rtlCol="0">
+                <a:spAutoFit/>
+              </a:bodyPr>
+              <a:lstStyle/>
+              <a:p>
+                <a:pPr algn="ctr"/>
+                <a:r>
+                  <a:rPr lang="en-US" dirty="0"/>
+                  <a:t>Structural Information</a:t>
+                </a:r>
+              </a:p>
+            </p:txBody>
+          </p:sp>
+          <p:cxnSp>
+            <p:nvCxnSpPr>
+              <p:cNvPr id="32" name="Straight Arrow Connector 31">
                 <a:extLst>
                   <a:ext uri="{FF2B5EF4-FFF2-40B4-BE49-F238E27FC236}">
-                    <a16:creationId xmlns:a16="http://schemas.microsoft.com/office/drawing/2014/main" id="{6675C67E-CEDF-4FEA-9A69-03A0AC5593A2}"/>
+                    <a16:creationId xmlns:a16="http://schemas.microsoft.com/office/drawing/2014/main" id="{55F89732-7BA3-4FD5-A343-59287AE21AB9}"/>
                   </a:ext>
                 </a:extLst>
               </p:cNvPr>
-              <p:cNvPicPr>
-                <a:picLocks noChangeAspect="1" noChangeArrowheads="1"/>
-              </p:cNvPicPr>
+              <p:cNvCxnSpPr>
+                <a:cxnSpLocks/>
+                <a:stCxn id="7" idx="3"/>
+                <a:endCxn id="44" idx="1"/>
+              </p:cNvCxnSpPr>
               <p:nvPr/>
-            </p:nvPicPr>
-            <p:blipFill>
-              <a:blip r:embed="rId6">
+            </p:nvCxnSpPr>
+            <p:spPr>
+              <a:xfrm flipV="1">
+                <a:off x="2212097" y="4762995"/>
+                <a:ext cx="381027" cy="1146198"/>
+              </a:xfrm>
+              <a:prstGeom prst="straightConnector1">
+                <a:avLst/>
+              </a:prstGeom>
+              <a:ln w="28575">
+                <a:solidFill>
+                  <a:schemeClr val="tx1"/>
+                </a:solidFill>
+                <a:tailEnd type="triangle"/>
+              </a:ln>
+            </p:spPr>
+            <p:style>
+              <a:lnRef idx="1">
+                <a:schemeClr val="dk1"/>
+              </a:lnRef>
+              <a:fillRef idx="0">
+                <a:schemeClr val="dk1"/>
+              </a:fillRef>
+              <a:effectRef idx="0">
+                <a:schemeClr val="dk1"/>
+              </a:effectRef>
+              <a:fontRef idx="minor">
+                <a:schemeClr val="tx1"/>
+              </a:fontRef>
+            </p:style>
+          </p:cxnSp>
+          <p:sp>
+            <p:nvSpPr>
+              <p:cNvPr id="42" name="TextBox 41">
                 <a:extLst>
-                  <a:ext uri="{28A0092B-C50C-407E-A947-70E740481C1C}">
-                    <a14:useLocalDpi xmlns:a14="http://schemas.microsoft.com/office/drawing/2010/main" val="0"/>
+                  <a:ext uri="{FF2B5EF4-FFF2-40B4-BE49-F238E27FC236}">
+                    <a16:creationId xmlns:a16="http://schemas.microsoft.com/office/drawing/2014/main" id="{8A0D1E3A-3680-4766-ABB1-18DDEE2E79F6}"/>
                   </a:ext>
                 </a:extLst>
-              </a:blip>
-              <a:srcRect/>
-              <a:stretch>
-                <a:fillRect/>
-              </a:stretch>
-            </p:blipFill>
-            <p:spPr bwMode="auto">
+              </p:cNvPr>
+              <p:cNvSpPr txBox="1"/>
+              <p:nvPr/>
+            </p:nvSpPr>
+            <p:spPr>
               <a:xfrm>
-                <a:off x="2504274" y="3679776"/>
-                <a:ext cx="2447925" cy="2400300"/>
+                <a:off x="3041949" y="3087544"/>
+                <a:ext cx="1818861" cy="646331"/>
               </a:xfrm>
               <a:prstGeom prst="rect">
                 <a:avLst/>
               </a:prstGeom>
               <a:noFill/>
-              <a:extLst>
-                <a:ext uri="{909E8E84-426E-40DD-AFC4-6F175D3DCCD1}">
-                  <a14:hiddenFill xmlns:a14="http://schemas.microsoft.com/office/drawing/2010/main">
-                    <a:solidFill>
-                      <a:srgbClr val="FFFFFF"/>
-                    </a:solidFill>
-                  </a14:hiddenFill>
-                </a:ext>
-              </a:extLst>
+            </p:spPr>
+            <p:txBody>
+              <a:bodyPr wrap="square" rtlCol="0">
+                <a:spAutoFit/>
+              </a:bodyPr>
+              <a:lstStyle/>
+              <a:p>
+                <a:pPr algn="ctr"/>
+                <a:r>
+                  <a:rPr lang="en-US" dirty="0"/>
+                  <a:t>Timbral Information</a:t>
+                </a:r>
+              </a:p>
+            </p:txBody>
+          </p:sp>
+          <p:pic>
+            <p:nvPicPr>
+              <p:cNvPr id="44" name="Picture 43">
+                <a:extLst>
+                  <a:ext uri="{FF2B5EF4-FFF2-40B4-BE49-F238E27FC236}">
+                    <a16:creationId xmlns:a16="http://schemas.microsoft.com/office/drawing/2014/main" id="{63F86E58-A4C5-4236-8186-0B814BBD9603}"/>
+                  </a:ext>
+                </a:extLst>
+              </p:cNvPr>
+              <p:cNvPicPr>
+                <a:picLocks noChangeAspect="1"/>
+              </p:cNvPicPr>
+              <p:nvPr/>
+            </p:nvPicPr>
+            <p:blipFill>
+              <a:blip r:embed="rId12"/>
+              <a:stretch>
+                <a:fillRect/>
+              </a:stretch>
+            </p:blipFill>
+            <p:spPr>
+              <a:xfrm>
+                <a:off x="2593124" y="3798981"/>
+                <a:ext cx="3093988" cy="1928027"/>
+              </a:xfrm>
+              <a:prstGeom prst="rect">
+                <a:avLst/>
+              </a:prstGeom>
             </p:spPr>
           </p:pic>
           <p:pic>
             <p:nvPicPr>
-              <p:cNvPr id="1036" name="Picture 12">
+              <p:cNvPr id="49" name="Picture 48">
                 <a:extLst>
                   <a:ext uri="{FF2B5EF4-FFF2-40B4-BE49-F238E27FC236}">
-                    <a16:creationId xmlns:a16="http://schemas.microsoft.com/office/drawing/2014/main" id="{B3553DDB-4F7F-4460-B108-4F0869B3EC79}"/>
+                    <a16:creationId xmlns:a16="http://schemas.microsoft.com/office/drawing/2014/main" id="{59F65C6E-D62E-429F-BE08-51C7384B822D}"/>
                   </a:ext>
                 </a:extLst>
               </p:cNvPr>
               <p:cNvPicPr>
-                <a:picLocks noChangeAspect="1" noChangeArrowheads="1"/>
+                <a:picLocks noChangeAspect="1"/>
               </p:cNvPicPr>
               <p:nvPr/>
             </p:nvPicPr>
             <p:blipFill>
-              <a:blip r:embed="rId7">
-                <a:extLst>
-                  <a:ext uri="{28A0092B-C50C-407E-A947-70E740481C1C}">
-                    <a14:useLocalDpi xmlns:a14="http://schemas.microsoft.com/office/drawing/2010/main" val="0"/>
-                  </a:ext>
-                </a:extLst>
-              </a:blip>
-              <a:srcRect/>
+              <a:blip r:embed="rId13"/>
               <a:stretch>
                 <a:fillRect/>
               </a:stretch>
             </p:blipFill>
-            <p:spPr bwMode="auto">
+            <p:spPr>
               <a:xfrm>
-                <a:off x="4968444" y="3679776"/>
-                <a:ext cx="2447925" cy="2400300"/>
+                <a:off x="2593124" y="2216501"/>
+                <a:ext cx="2834886" cy="777307"/>
               </a:xfrm>
               <a:prstGeom prst="rect">
                 <a:avLst/>
               </a:prstGeom>
-              <a:noFill/>
-              <a:extLst>
-                <a:ext uri="{909E8E84-426E-40DD-AFC4-6F175D3DCCD1}">
-                  <a14:hiddenFill xmlns:a14="http://schemas.microsoft.com/office/drawing/2010/main">
-                    <a:solidFill>
-                      <a:srgbClr val="FFFFFF"/>
-                    </a:solidFill>
-                  </a14:hiddenFill>
-                </a:ext>
-              </a:extLst>
             </p:spPr>
           </p:pic>
-        </p:grpSp>
-        <p:grpSp>
-          <p:nvGrpSpPr>
-            <p:cNvPr id="5" name="Group 4">
-              <a:extLst>
-                <a:ext uri="{FF2B5EF4-FFF2-40B4-BE49-F238E27FC236}">
-                  <a16:creationId xmlns:a16="http://schemas.microsoft.com/office/drawing/2014/main" id="{C6749DD4-8B3B-4508-B81A-BDD624A9065D}"/>
-                </a:ext>
-              </a:extLst>
-            </p:cNvPr>
-            <p:cNvGrpSpPr/>
-            <p:nvPr/>
-          </p:nvGrpSpPr>
-          <p:grpSpPr>
-            <a:xfrm>
-              <a:off x="-4960356" y="6254332"/>
-              <a:ext cx="4880843" cy="2392942"/>
-              <a:chOff x="-1780432" y="2740578"/>
-              <a:chExt cx="4895850" cy="2400300"/>
-            </a:xfrm>
-          </p:grpSpPr>
-          <p:pic>
-            <p:nvPicPr>
-              <p:cNvPr id="1038" name="Picture 14">
+          <p:cxnSp>
+            <p:nvCxnSpPr>
+              <p:cNvPr id="58" name="Straight Arrow Connector 57">
                 <a:extLst>
                   <a:ext uri="{FF2B5EF4-FFF2-40B4-BE49-F238E27FC236}">
-                    <a16:creationId xmlns:a16="http://schemas.microsoft.com/office/drawing/2014/main" id="{4CD7B1BA-B1A7-4798-B553-1639B1F550E1}"/>
+                    <a16:creationId xmlns:a16="http://schemas.microsoft.com/office/drawing/2014/main" id="{C47D6D63-10B6-41FC-8385-DC48D707C4A4}"/>
                   </a:ext>
                 </a:extLst>
               </p:cNvPr>
-              <p:cNvPicPr>
-                <a:picLocks noChangeAspect="1" noChangeArrowheads="1"/>
-              </p:cNvPicPr>
+              <p:cNvCxnSpPr>
+                <a:cxnSpLocks/>
+                <a:stCxn id="9" idx="3"/>
+                <a:endCxn id="49" idx="1"/>
+              </p:cNvCxnSpPr>
               <p:nvPr/>
-            </p:nvPicPr>
-            <p:blipFill>
-              <a:blip r:embed="rId8">
-                <a:extLst>
-                  <a:ext uri="{28A0092B-C50C-407E-A947-70E740481C1C}">
-                    <a14:useLocalDpi xmlns:a14="http://schemas.microsoft.com/office/drawing/2010/main" val="0"/>
-                  </a:ext>
-                </a:extLst>
-              </a:blip>
-              <a:srcRect/>
-              <a:stretch>
-                <a:fillRect/>
-              </a:stretch>
-            </p:blipFill>
-            <p:spPr bwMode="auto">
+            </p:nvCxnSpPr>
+            <p:spPr>
               <a:xfrm>
-                <a:off x="-1780432" y="2740578"/>
-                <a:ext cx="2447925" cy="2400300"/>
+                <a:off x="1951658" y="1102827"/>
+                <a:ext cx="641466" cy="1502328"/>
               </a:xfrm>
-              <a:prstGeom prst="rect">
+              <a:prstGeom prst="straightConnector1">
                 <a:avLst/>
               </a:prstGeom>
-              <a:noFill/>
-              <a:extLst>
-                <a:ext uri="{909E8E84-426E-40DD-AFC4-6F175D3DCCD1}">
-                  <a14:hiddenFill xmlns:a14="http://schemas.microsoft.com/office/drawing/2010/main">
-                    <a:solidFill>
-                      <a:srgbClr val="FFFFFF"/>
-                    </a:solidFill>
-                  </a14:hiddenFill>
-                </a:ext>
-              </a:extLst>
+              <a:ln w="28575">
+                <a:solidFill>
+                  <a:schemeClr val="tx1"/>
+                </a:solidFill>
+                <a:tailEnd type="triangle"/>
+              </a:ln>
             </p:spPr>
-          </p:pic>
-          <p:pic>
-            <p:nvPicPr>
-              <p:cNvPr id="1040" name="Picture 16">
-                <a:extLst>
-                  <a:ext uri="{FF2B5EF4-FFF2-40B4-BE49-F238E27FC236}">
-                    <a16:creationId xmlns:a16="http://schemas.microsoft.com/office/drawing/2014/main" id="{8AE200ED-8E40-4272-BF01-4948689D1828}"/>
-                  </a:ext>
-                </a:extLst>
-              </p:cNvPr>
-              <p:cNvPicPr>
-                <a:picLocks noChangeAspect="1" noChangeArrowheads="1"/>
-              </p:cNvPicPr>
-              <p:nvPr/>
-            </p:nvPicPr>
-            <p:blipFill>
-              <a:blip r:embed="rId9">
-                <a:extLst>
-                  <a:ext uri="{28A0092B-C50C-407E-A947-70E740481C1C}">
-                    <a14:useLocalDpi xmlns:a14="http://schemas.microsoft.com/office/drawing/2010/main" val="0"/>
-                  </a:ext>
-                </a:extLst>
-              </a:blip>
-              <a:srcRect/>
-              <a:stretch>
-                <a:fillRect/>
-              </a:stretch>
-            </p:blipFill>
-            <p:spPr bwMode="auto">
-              <a:xfrm>
-                <a:off x="667493" y="2740578"/>
-                <a:ext cx="2447925" cy="2400300"/>
-              </a:xfrm>
-              <a:prstGeom prst="rect">
-                <a:avLst/>
-              </a:prstGeom>
-              <a:noFill/>
-              <a:extLst>
-                <a:ext uri="{909E8E84-426E-40DD-AFC4-6F175D3DCCD1}">
-                  <a14:hiddenFill xmlns:a14="http://schemas.microsoft.com/office/drawing/2010/main">
-                    <a:solidFill>
-                      <a:srgbClr val="FFFFFF"/>
-                    </a:solidFill>
-                  </a14:hiddenFill>
-                </a:ext>
-              </a:extLst>
-            </p:spPr>
-          </p:pic>
+            <p:style>
+              <a:lnRef idx="1">
+                <a:schemeClr val="dk1"/>
+              </a:lnRef>
+              <a:fillRef idx="0">
+                <a:schemeClr val="dk1"/>
+              </a:fillRef>
+              <a:effectRef idx="0">
+                <a:schemeClr val="dk1"/>
+              </a:effectRef>
+              <a:fontRef idx="minor">
+                <a:schemeClr val="tx1"/>
+              </a:fontRef>
+            </p:style>
+          </p:cxnSp>
         </p:grpSp>
-        <p:pic>
-          <p:nvPicPr>
-            <p:cNvPr id="7" name="Picture 6">
+        <p:cxnSp>
+          <p:nvCxnSpPr>
+            <p:cNvPr id="67" name="Straight Arrow Connector 66">
               <a:extLst>
                 <a:ext uri="{FF2B5EF4-FFF2-40B4-BE49-F238E27FC236}">
-                  <a16:creationId xmlns:a16="http://schemas.microsoft.com/office/drawing/2014/main" id="{54089F8D-E26D-4C67-86A3-4B846E2F3E62}"/>
-                </a:ext>
-              </a:extLst>
-            </p:cNvPr>
-            <p:cNvPicPr>
-              <a:picLocks noChangeAspect="1"/>
-            </p:cNvPicPr>
-            <p:nvPr/>
-          </p:nvPicPr>
-          <p:blipFill>
-            <a:blip r:embed="rId10"/>
-            <a:stretch>
-              <a:fillRect/>
-            </a:stretch>
-          </p:blipFill>
-          <p:spPr>
-            <a:xfrm>
-              <a:off x="5487672" y="4606134"/>
-              <a:ext cx="5439055" cy="1009702"/>
-            </a:xfrm>
-            <a:prstGeom prst="rect">
-              <a:avLst/>
-            </a:prstGeom>
-          </p:spPr>
-        </p:pic>
-        <p:pic>
-          <p:nvPicPr>
-            <p:cNvPr id="9" name="Picture 8">
-              <a:extLst>
-                <a:ext uri="{FF2B5EF4-FFF2-40B4-BE49-F238E27FC236}">
-                  <a16:creationId xmlns:a16="http://schemas.microsoft.com/office/drawing/2014/main" id="{50E19DFA-507C-4A24-B6BE-C4F8694AB904}"/>
-                </a:ext>
-              </a:extLst>
-            </p:cNvPr>
-            <p:cNvPicPr>
-              <a:picLocks noChangeAspect="1"/>
-            </p:cNvPicPr>
-            <p:nvPr/>
-          </p:nvPicPr>
-          <p:blipFill>
-            <a:blip r:embed="rId11"/>
-            <a:stretch>
-              <a:fillRect/>
-            </a:stretch>
-          </p:blipFill>
-          <p:spPr>
-            <a:xfrm>
-              <a:off x="9208888" y="33142"/>
-              <a:ext cx="1457400" cy="542953"/>
-            </a:xfrm>
-            <a:prstGeom prst="rect">
-              <a:avLst/>
-            </a:prstGeom>
-          </p:spPr>
-        </p:pic>
-        <p:sp>
-          <p:nvSpPr>
-            <p:cNvPr id="10" name="TextBox 9">
-              <a:extLst>
-                <a:ext uri="{FF2B5EF4-FFF2-40B4-BE49-F238E27FC236}">
-                  <a16:creationId xmlns:a16="http://schemas.microsoft.com/office/drawing/2014/main" id="{9F0DE0FF-88CD-4F6C-AEA9-7ECC8C114684}"/>
-                </a:ext>
-              </a:extLst>
-            </p:cNvPr>
-            <p:cNvSpPr txBox="1"/>
-            <p:nvPr/>
-          </p:nvSpPr>
-          <p:spPr>
-            <a:xfrm>
-              <a:off x="-4126712" y="-1324640"/>
-              <a:ext cx="1818861" cy="369332"/>
-            </a:xfrm>
-            <a:prstGeom prst="rect">
-              <a:avLst/>
-            </a:prstGeom>
-            <a:noFill/>
-          </p:spPr>
-          <p:txBody>
-            <a:bodyPr wrap="square" rtlCol="0">
-              <a:spAutoFit/>
-            </a:bodyPr>
-            <a:lstStyle/>
-            <a:p>
-              <a:pPr algn="ctr"/>
-              <a:r>
-                <a:rPr lang="en-US" dirty="0"/>
-                <a:t>Input Image</a:t>
-              </a:r>
-            </a:p>
-          </p:txBody>
-        </p:sp>
-        <p:sp>
-          <p:nvSpPr>
-            <p:cNvPr id="19" name="TextBox 18">
-              <a:extLst>
-                <a:ext uri="{FF2B5EF4-FFF2-40B4-BE49-F238E27FC236}">
-                  <a16:creationId xmlns:a16="http://schemas.microsoft.com/office/drawing/2014/main" id="{9AFFE3C4-5708-4ED7-A53B-F05C68B79BE2}"/>
-                </a:ext>
-              </a:extLst>
-            </p:cNvPr>
-            <p:cNvSpPr txBox="1"/>
-            <p:nvPr/>
-          </p:nvSpPr>
-          <p:spPr>
-            <a:xfrm>
-              <a:off x="158902" y="-1324640"/>
-              <a:ext cx="1818861" cy="369332"/>
-            </a:xfrm>
-            <a:prstGeom prst="rect">
-              <a:avLst/>
-            </a:prstGeom>
-            <a:noFill/>
-          </p:spPr>
-          <p:txBody>
-            <a:bodyPr wrap="square" rtlCol="0">
-              <a:spAutoFit/>
-            </a:bodyPr>
-            <a:lstStyle/>
-            <a:p>
-              <a:pPr algn="ctr"/>
-              <a:r>
-                <a:rPr lang="en-US" dirty="0"/>
-                <a:t>Cropped Image</a:t>
-              </a:r>
-            </a:p>
-          </p:txBody>
-        </p:sp>
-        <p:cxnSp>
-          <p:nvCxnSpPr>
-            <p:cNvPr id="12" name="Straight Arrow Connector 11">
-              <a:extLst>
-                <a:ext uri="{FF2B5EF4-FFF2-40B4-BE49-F238E27FC236}">
-                  <a16:creationId xmlns:a16="http://schemas.microsoft.com/office/drawing/2014/main" id="{54890B26-7307-4315-A041-A7918FE7A570}"/>
+                  <a16:creationId xmlns:a16="http://schemas.microsoft.com/office/drawing/2014/main" id="{6AEAC621-66BC-4FCA-A913-35EFB66F60FC}"/>
                 </a:ext>
               </a:extLst>
             </p:cNvPr>
             <p:cNvCxnSpPr>
-              <a:stCxn id="1026" idx="3"/>
-              <a:endCxn id="1028" idx="1"/>
+              <a:cxnSpLocks/>
+              <a:stCxn id="49" idx="3"/>
+              <a:endCxn id="73" idx="0"/>
             </p:cNvCxnSpPr>
             <p:nvPr/>
           </p:nvCxnSpPr>
           <p:spPr>
             <a:xfrm>
-              <a:off x="-1474206" y="304619"/>
-              <a:ext cx="1318577" cy="0"/>
+              <a:off x="5242815" y="2466259"/>
+              <a:ext cx="1096254" cy="613798"/>
+            </a:xfrm>
+            <a:prstGeom prst="straightConnector1">
+              <a:avLst/>
+            </a:prstGeom>
+            <a:ln w="28575">
+              <a:solidFill>
+                <a:schemeClr val="tx1"/>
+              </a:solidFill>
+              <a:tailEnd type="triangle"/>
+            </a:ln>
+          </p:spPr>
+          <p:style>
+            <a:lnRef idx="1">
+              <a:schemeClr val="dk1"/>
+            </a:lnRef>
+            <a:fillRef idx="0">
+              <a:schemeClr val="dk1"/>
+            </a:fillRef>
+            <a:effectRef idx="0">
+              <a:schemeClr val="dk1"/>
+            </a:effectRef>
+            <a:fontRef idx="minor">
+              <a:schemeClr val="tx1"/>
+            </a:fontRef>
+          </p:style>
+        </p:cxnSp>
+        <p:cxnSp>
+          <p:nvCxnSpPr>
+            <p:cNvPr id="70" name="Straight Arrow Connector 69">
+              <a:extLst>
+                <a:ext uri="{FF2B5EF4-FFF2-40B4-BE49-F238E27FC236}">
+                  <a16:creationId xmlns:a16="http://schemas.microsoft.com/office/drawing/2014/main" id="{1C80EC32-8340-45C9-8775-214DAF12B702}"/>
+                </a:ext>
+              </a:extLst>
+            </p:cNvPr>
+            <p:cNvCxnSpPr>
+              <a:cxnSpLocks/>
+              <a:stCxn id="44" idx="3"/>
+              <a:endCxn id="73" idx="2"/>
+            </p:cNvCxnSpPr>
+            <p:nvPr/>
+          </p:nvCxnSpPr>
+          <p:spPr>
+            <a:xfrm flipV="1">
+              <a:off x="5501917" y="3449389"/>
+              <a:ext cx="837152" cy="1174710"/>
             </a:xfrm>
             <a:prstGeom prst="straightConnector1">
               <a:avLst/>
@@ -3938,10 +4688,10 @@
         </p:cxnSp>
         <p:sp>
           <p:nvSpPr>
-            <p:cNvPr id="22" name="TextBox 21">
+            <p:cNvPr id="73" name="TextBox 72">
               <a:extLst>
                 <a:ext uri="{FF2B5EF4-FFF2-40B4-BE49-F238E27FC236}">
-                  <a16:creationId xmlns:a16="http://schemas.microsoft.com/office/drawing/2014/main" id="{183F2C68-7261-4DAD-8056-DBF36C479C14}"/>
+                  <a16:creationId xmlns:a16="http://schemas.microsoft.com/office/drawing/2014/main" id="{1C2F9A80-D208-4BD7-AA09-0F03FEBB6B50}"/>
                 </a:ext>
               </a:extLst>
             </p:cNvPr>
@@ -3950,7 +4700,7 @@
           </p:nvSpPr>
           <p:spPr>
             <a:xfrm>
-              <a:off x="4831136" y="-2241106"/>
+              <a:off x="5429638" y="3080057"/>
               <a:ext cx="1818861" cy="369332"/>
             </a:xfrm>
             <a:prstGeom prst="rect">
@@ -3967,362 +4717,11 @@
               <a:pPr algn="ctr"/>
               <a:r>
                 <a:rPr lang="en-US" dirty="0"/>
-                <a:t>RGB Channels</a:t>
+                <a:t>Soundscape!</a:t>
               </a:r>
             </a:p>
           </p:txBody>
         </p:sp>
-        <p:cxnSp>
-          <p:nvCxnSpPr>
-            <p:cNvPr id="23" name="Straight Arrow Connector 22">
-              <a:extLst>
-                <a:ext uri="{FF2B5EF4-FFF2-40B4-BE49-F238E27FC236}">
-                  <a16:creationId xmlns:a16="http://schemas.microsoft.com/office/drawing/2014/main" id="{B3BB30B9-DAB7-4B6D-A0B5-A2D8C71E3DCF}"/>
-                </a:ext>
-              </a:extLst>
-            </p:cNvPr>
-            <p:cNvCxnSpPr>
-              <a:cxnSpLocks/>
-              <a:stCxn id="1028" idx="3"/>
-              <a:endCxn id="1030" idx="1"/>
-            </p:cNvCxnSpPr>
-            <p:nvPr/>
-          </p:nvCxnSpPr>
-          <p:spPr>
-            <a:xfrm>
-              <a:off x="2292296" y="304619"/>
-              <a:ext cx="1343547" cy="0"/>
-            </a:xfrm>
-            <a:prstGeom prst="straightConnector1">
-              <a:avLst/>
-            </a:prstGeom>
-            <a:ln w="28575">
-              <a:solidFill>
-                <a:schemeClr val="tx1"/>
-              </a:solidFill>
-              <a:tailEnd type="triangle"/>
-            </a:ln>
-          </p:spPr>
-          <p:style>
-            <a:lnRef idx="1">
-              <a:schemeClr val="dk1"/>
-            </a:lnRef>
-            <a:fillRef idx="0">
-              <a:schemeClr val="dk1"/>
-            </a:fillRef>
-            <a:effectRef idx="0">
-              <a:schemeClr val="dk1"/>
-            </a:effectRef>
-            <a:fontRef idx="minor">
-              <a:schemeClr val="tx1"/>
-            </a:fontRef>
-          </p:style>
-        </p:cxnSp>
-        <p:cxnSp>
-          <p:nvCxnSpPr>
-            <p:cNvPr id="16" name="Connector: Curved 15">
-              <a:extLst>
-                <a:ext uri="{FF2B5EF4-FFF2-40B4-BE49-F238E27FC236}">
-                  <a16:creationId xmlns:a16="http://schemas.microsoft.com/office/drawing/2014/main" id="{57DCFE8C-80F0-4C86-81E6-322A8FC5D084}"/>
-                </a:ext>
-              </a:extLst>
-            </p:cNvPr>
-            <p:cNvCxnSpPr>
-              <a:stCxn id="1030" idx="2"/>
-              <a:endCxn id="1034" idx="0"/>
-            </p:cNvCxnSpPr>
-            <p:nvPr/>
-          </p:nvCxnSpPr>
-          <p:spPr>
-            <a:xfrm rot="5400000">
-              <a:off x="1802945" y="-876552"/>
-              <a:ext cx="706538" cy="7168709"/>
-            </a:xfrm>
-            <a:prstGeom prst="curvedConnector3">
-              <a:avLst>
-                <a:gd name="adj1" fmla="val 48593"/>
-              </a:avLst>
-            </a:prstGeom>
-            <a:ln w="28575">
-              <a:solidFill>
-                <a:schemeClr val="tx1"/>
-              </a:solidFill>
-              <a:tailEnd type="triangle"/>
-            </a:ln>
-          </p:spPr>
-          <p:style>
-            <a:lnRef idx="1">
-              <a:schemeClr val="accent1"/>
-            </a:lnRef>
-            <a:fillRef idx="0">
-              <a:schemeClr val="accent1"/>
-            </a:fillRef>
-            <a:effectRef idx="0">
-              <a:schemeClr val="accent1"/>
-            </a:effectRef>
-            <a:fontRef idx="minor">
-              <a:schemeClr val="tx1"/>
-            </a:fontRef>
-          </p:style>
-        </p:cxnSp>
-        <p:sp>
-          <p:nvSpPr>
-            <p:cNvPr id="30" name="TextBox 29">
-              <a:extLst>
-                <a:ext uri="{FF2B5EF4-FFF2-40B4-BE49-F238E27FC236}">
-                  <a16:creationId xmlns:a16="http://schemas.microsoft.com/office/drawing/2014/main" id="{38944F46-A4EA-49AE-A54A-B9D8503BC95F}"/>
-                </a:ext>
-              </a:extLst>
-            </p:cNvPr>
-            <p:cNvSpPr txBox="1"/>
-            <p:nvPr/>
-          </p:nvSpPr>
-          <p:spPr>
-            <a:xfrm>
-              <a:off x="-4291848" y="2612502"/>
-              <a:ext cx="1818861" cy="369332"/>
-            </a:xfrm>
-            <a:prstGeom prst="rect">
-              <a:avLst/>
-            </a:prstGeom>
-            <a:noFill/>
-          </p:spPr>
-          <p:txBody>
-            <a:bodyPr wrap="square" rtlCol="0">
-              <a:spAutoFit/>
-            </a:bodyPr>
-            <a:lstStyle/>
-            <a:p>
-              <a:pPr algn="ctr"/>
-              <a:r>
-                <a:rPr lang="en-US" dirty="0"/>
-                <a:t>HSV</a:t>
-              </a:r>
-            </a:p>
-          </p:txBody>
-        </p:sp>
-        <p:cxnSp>
-          <p:nvCxnSpPr>
-            <p:cNvPr id="31" name="Straight Arrow Connector 30">
-              <a:extLst>
-                <a:ext uri="{FF2B5EF4-FFF2-40B4-BE49-F238E27FC236}">
-                  <a16:creationId xmlns:a16="http://schemas.microsoft.com/office/drawing/2014/main" id="{5D354321-A812-4A16-80C0-2C82D2A9D8B7}"/>
-                </a:ext>
-              </a:extLst>
-            </p:cNvPr>
-            <p:cNvCxnSpPr>
-              <a:cxnSpLocks/>
-              <a:stCxn id="1032" idx="2"/>
-            </p:cNvCxnSpPr>
-            <p:nvPr/>
-          </p:nvCxnSpPr>
-          <p:spPr>
-            <a:xfrm>
-              <a:off x="-3788137" y="5359897"/>
-              <a:ext cx="0" cy="800319"/>
-            </a:xfrm>
-            <a:prstGeom prst="straightConnector1">
-              <a:avLst/>
-            </a:prstGeom>
-            <a:ln w="28575">
-              <a:solidFill>
-                <a:schemeClr val="tx1"/>
-              </a:solidFill>
-              <a:tailEnd type="triangle"/>
-            </a:ln>
-          </p:spPr>
-          <p:style>
-            <a:lnRef idx="1">
-              <a:schemeClr val="dk1"/>
-            </a:lnRef>
-            <a:fillRef idx="0">
-              <a:schemeClr val="dk1"/>
-            </a:fillRef>
-            <a:effectRef idx="0">
-              <a:schemeClr val="dk1"/>
-            </a:effectRef>
-            <a:fontRef idx="minor">
-              <a:schemeClr val="tx1"/>
-            </a:fontRef>
-          </p:style>
-        </p:cxnSp>
-        <p:sp>
-          <p:nvSpPr>
-            <p:cNvPr id="36" name="TextBox 35">
-              <a:extLst>
-                <a:ext uri="{FF2B5EF4-FFF2-40B4-BE49-F238E27FC236}">
-                  <a16:creationId xmlns:a16="http://schemas.microsoft.com/office/drawing/2014/main" id="{695C3275-7B46-4CB0-93E6-54AF11F2E193}"/>
-                </a:ext>
-              </a:extLst>
-            </p:cNvPr>
-            <p:cNvSpPr txBox="1"/>
-            <p:nvPr/>
-          </p:nvSpPr>
-          <p:spPr>
-            <a:xfrm>
-              <a:off x="-3621058" y="5760056"/>
-              <a:ext cx="4147832" cy="369332"/>
-            </a:xfrm>
-            <a:prstGeom prst="rect">
-              <a:avLst/>
-            </a:prstGeom>
-            <a:noFill/>
-          </p:spPr>
-          <p:txBody>
-            <a:bodyPr wrap="square" rtlCol="0">
-              <a:spAutoFit/>
-            </a:bodyPr>
-            <a:lstStyle/>
-            <a:p>
-              <a:pPr algn="ctr"/>
-              <a:r>
-                <a:rPr lang="en-US" dirty="0"/>
-                <a:t>K-Means Clustering and Block Reduction</a:t>
-              </a:r>
-            </a:p>
-          </p:txBody>
-        </p:sp>
-        <p:cxnSp>
-          <p:nvCxnSpPr>
-            <p:cNvPr id="38" name="Connector: Curved 37">
-              <a:extLst>
-                <a:ext uri="{FF2B5EF4-FFF2-40B4-BE49-F238E27FC236}">
-                  <a16:creationId xmlns:a16="http://schemas.microsoft.com/office/drawing/2014/main" id="{0E64E53F-892B-4871-B7B8-CF0146757C93}"/>
-                </a:ext>
-              </a:extLst>
-            </p:cNvPr>
-            <p:cNvCxnSpPr>
-              <a:cxnSpLocks/>
-              <a:stCxn id="1036" idx="3"/>
-              <a:endCxn id="7" idx="1"/>
-            </p:cNvCxnSpPr>
-            <p:nvPr/>
-          </p:nvCxnSpPr>
-          <p:spPr>
-            <a:xfrm>
-              <a:off x="2104074" y="4210484"/>
-              <a:ext cx="3383598" cy="900501"/>
-            </a:xfrm>
-            <a:prstGeom prst="curvedConnector3">
-              <a:avLst>
-                <a:gd name="adj1" fmla="val 50000"/>
-              </a:avLst>
-            </a:prstGeom>
-            <a:ln w="28575">
-              <a:solidFill>
-                <a:schemeClr val="tx1"/>
-              </a:solidFill>
-              <a:tailEnd type="triangle"/>
-            </a:ln>
-          </p:spPr>
-          <p:style>
-            <a:lnRef idx="1">
-              <a:schemeClr val="accent1"/>
-            </a:lnRef>
-            <a:fillRef idx="0">
-              <a:schemeClr val="accent1"/>
-            </a:fillRef>
-            <a:effectRef idx="0">
-              <a:schemeClr val="accent1"/>
-            </a:effectRef>
-            <a:fontRef idx="minor">
-              <a:schemeClr val="tx1"/>
-            </a:fontRef>
-          </p:style>
-        </p:cxnSp>
-        <p:cxnSp>
-          <p:nvCxnSpPr>
-            <p:cNvPr id="41" name="Connector: Curved 40">
-              <a:extLst>
-                <a:ext uri="{FF2B5EF4-FFF2-40B4-BE49-F238E27FC236}">
-                  <a16:creationId xmlns:a16="http://schemas.microsoft.com/office/drawing/2014/main" id="{139C658E-C68C-427F-81FF-7561A0A7C2F1}"/>
-                </a:ext>
-              </a:extLst>
-            </p:cNvPr>
-            <p:cNvCxnSpPr>
-              <a:cxnSpLocks/>
-              <a:stCxn id="1040" idx="3"/>
-              <a:endCxn id="7" idx="1"/>
-            </p:cNvCxnSpPr>
-            <p:nvPr/>
-          </p:nvCxnSpPr>
-          <p:spPr>
-            <a:xfrm flipV="1">
-              <a:off x="-79513" y="5110985"/>
-              <a:ext cx="5567185" cy="2339818"/>
-            </a:xfrm>
-            <a:prstGeom prst="curvedConnector3">
-              <a:avLst>
-                <a:gd name="adj1" fmla="val 50000"/>
-              </a:avLst>
-            </a:prstGeom>
-            <a:ln w="28575">
-              <a:solidFill>
-                <a:schemeClr val="tx1"/>
-              </a:solidFill>
-              <a:tailEnd type="triangle"/>
-            </a:ln>
-          </p:spPr>
-          <p:style>
-            <a:lnRef idx="1">
-              <a:schemeClr val="accent1"/>
-            </a:lnRef>
-            <a:fillRef idx="0">
-              <a:schemeClr val="accent1"/>
-            </a:fillRef>
-            <a:effectRef idx="0">
-              <a:schemeClr val="accent1"/>
-            </a:effectRef>
-            <a:fontRef idx="minor">
-              <a:schemeClr val="tx1"/>
-            </a:fontRef>
-          </p:style>
-        </p:cxnSp>
-        <p:cxnSp>
-          <p:nvCxnSpPr>
-            <p:cNvPr id="47" name="Straight Arrow Connector 46">
-              <a:extLst>
-                <a:ext uri="{FF2B5EF4-FFF2-40B4-BE49-F238E27FC236}">
-                  <a16:creationId xmlns:a16="http://schemas.microsoft.com/office/drawing/2014/main" id="{8E36EDAF-19FE-4862-9020-A85A87C3F7D2}"/>
-                </a:ext>
-              </a:extLst>
-            </p:cNvPr>
-            <p:cNvCxnSpPr>
-              <a:cxnSpLocks/>
-              <a:stCxn id="1030" idx="3"/>
-            </p:cNvCxnSpPr>
-            <p:nvPr/>
-          </p:nvCxnSpPr>
-          <p:spPr>
-            <a:xfrm>
-              <a:off x="7845292" y="304619"/>
-              <a:ext cx="1139682" cy="0"/>
-            </a:xfrm>
-            <a:prstGeom prst="straightConnector1">
-              <a:avLst/>
-            </a:prstGeom>
-            <a:ln w="28575">
-              <a:solidFill>
-                <a:schemeClr val="tx1"/>
-              </a:solidFill>
-              <a:tailEnd type="triangle"/>
-            </a:ln>
-          </p:spPr>
-          <p:style>
-            <a:lnRef idx="1">
-              <a:schemeClr val="dk1"/>
-            </a:lnRef>
-            <a:fillRef idx="0">
-              <a:schemeClr val="dk1"/>
-            </a:fillRef>
-            <a:effectRef idx="0">
-              <a:schemeClr val="dk1"/>
-            </a:effectRef>
-            <a:fontRef idx="minor">
-              <a:schemeClr val="tx1"/>
-            </a:fontRef>
-          </p:style>
-        </p:cxnSp>
       </p:grpSp>
     </p:spTree>
     <p:extLst>

</xml_diff>